<commit_message>
add slides with current work
</commit_message>
<xml_diff>
--- a/Extracting Data points_powerpoint.pptx
+++ b/Extracting Data points_powerpoint.pptx
@@ -10,6 +10,8 @@
     <p:sldId id="258" r:id="rId4"/>
     <p:sldId id="259" r:id="rId5"/>
     <p:sldId id="260" r:id="rId6"/>
+    <p:sldId id="261" r:id="rId7"/>
+    <p:sldId id="262" r:id="rId8"/>
   </p:sldIdLst>
   <p:sldSz cx="12192000" cy="6858000"/>
   <p:notesSz cx="6858000" cy="9144000"/>
@@ -108,6 +110,11 @@
       </a:defRPr>
     </a:lvl9pPr>
   </p:defaultTextStyle>
+  <p:extLst>
+    <p:ext uri="{EFAFB233-063F-42B5-8137-9DF3F51BA10A}">
+      <p15:sldGuideLst xmlns:p15="http://schemas.microsoft.com/office/powerpoint/2012/main"/>
+    </p:ext>
+  </p:extLst>
 </p:presentation>
 </file>
 
@@ -242,7 +249,7 @@
           <a:p>
             <a:fld id="{7DC00FD3-F37A-4112-A7E3-59ABF1E0E8D0}" type="datetimeFigureOut">
               <a:rPr lang="en-US" smtClean="0"/>
-              <a:t>7/28/2015</a:t>
+              <a:t>7/29/2015</a:t>
             </a:fld>
             <a:endParaRPr lang="en-US"/>
           </a:p>
@@ -412,7 +419,7 @@
           <a:p>
             <a:fld id="{7DC00FD3-F37A-4112-A7E3-59ABF1E0E8D0}" type="datetimeFigureOut">
               <a:rPr lang="en-US" smtClean="0"/>
-              <a:t>7/28/2015</a:t>
+              <a:t>7/29/2015</a:t>
             </a:fld>
             <a:endParaRPr lang="en-US"/>
           </a:p>
@@ -592,7 +599,7 @@
           <a:p>
             <a:fld id="{7DC00FD3-F37A-4112-A7E3-59ABF1E0E8D0}" type="datetimeFigureOut">
               <a:rPr lang="en-US" smtClean="0"/>
-              <a:t>7/28/2015</a:t>
+              <a:t>7/29/2015</a:t>
             </a:fld>
             <a:endParaRPr lang="en-US"/>
           </a:p>
@@ -762,7 +769,7 @@
           <a:p>
             <a:fld id="{7DC00FD3-F37A-4112-A7E3-59ABF1E0E8D0}" type="datetimeFigureOut">
               <a:rPr lang="en-US" smtClean="0"/>
-              <a:t>7/28/2015</a:t>
+              <a:t>7/29/2015</a:t>
             </a:fld>
             <a:endParaRPr lang="en-US"/>
           </a:p>
@@ -1008,7 +1015,7 @@
           <a:p>
             <a:fld id="{7DC00FD3-F37A-4112-A7E3-59ABF1E0E8D0}" type="datetimeFigureOut">
               <a:rPr lang="en-US" smtClean="0"/>
-              <a:t>7/28/2015</a:t>
+              <a:t>7/29/2015</a:t>
             </a:fld>
             <a:endParaRPr lang="en-US"/>
           </a:p>
@@ -1240,7 +1247,7 @@
           <a:p>
             <a:fld id="{7DC00FD3-F37A-4112-A7E3-59ABF1E0E8D0}" type="datetimeFigureOut">
               <a:rPr lang="en-US" smtClean="0"/>
-              <a:t>7/28/2015</a:t>
+              <a:t>7/29/2015</a:t>
             </a:fld>
             <a:endParaRPr lang="en-US"/>
           </a:p>
@@ -1607,7 +1614,7 @@
           <a:p>
             <a:fld id="{7DC00FD3-F37A-4112-A7E3-59ABF1E0E8D0}" type="datetimeFigureOut">
               <a:rPr lang="en-US" smtClean="0"/>
-              <a:t>7/28/2015</a:t>
+              <a:t>7/29/2015</a:t>
             </a:fld>
             <a:endParaRPr lang="en-US"/>
           </a:p>
@@ -1725,7 +1732,7 @@
           <a:p>
             <a:fld id="{7DC00FD3-F37A-4112-A7E3-59ABF1E0E8D0}" type="datetimeFigureOut">
               <a:rPr lang="en-US" smtClean="0"/>
-              <a:t>7/28/2015</a:t>
+              <a:t>7/29/2015</a:t>
             </a:fld>
             <a:endParaRPr lang="en-US"/>
           </a:p>
@@ -1820,7 +1827,7 @@
           <a:p>
             <a:fld id="{7DC00FD3-F37A-4112-A7E3-59ABF1E0E8D0}" type="datetimeFigureOut">
               <a:rPr lang="en-US" smtClean="0"/>
-              <a:t>7/28/2015</a:t>
+              <a:t>7/29/2015</a:t>
             </a:fld>
             <a:endParaRPr lang="en-US"/>
           </a:p>
@@ -2097,7 +2104,7 @@
           <a:p>
             <a:fld id="{7DC00FD3-F37A-4112-A7E3-59ABF1E0E8D0}" type="datetimeFigureOut">
               <a:rPr lang="en-US" smtClean="0"/>
-              <a:t>7/28/2015</a:t>
+              <a:t>7/29/2015</a:t>
             </a:fld>
             <a:endParaRPr lang="en-US"/>
           </a:p>
@@ -2350,7 +2357,7 @@
           <a:p>
             <a:fld id="{7DC00FD3-F37A-4112-A7E3-59ABF1E0E8D0}" type="datetimeFigureOut">
               <a:rPr lang="en-US" smtClean="0"/>
-              <a:t>7/28/2015</a:t>
+              <a:t>7/29/2015</a:t>
             </a:fld>
             <a:endParaRPr lang="en-US"/>
           </a:p>
@@ -2563,7 +2570,7 @@
           <a:p>
             <a:fld id="{7DC00FD3-F37A-4112-A7E3-59ABF1E0E8D0}" type="datetimeFigureOut">
               <a:rPr lang="en-US" smtClean="0"/>
-              <a:t>7/28/2015</a:t>
+              <a:t>7/29/2015</a:t>
             </a:fld>
             <a:endParaRPr lang="en-US"/>
           </a:p>
@@ -3550,6 +3557,746 @@
 </p:sld>
 </file>
 
+<file path=ppt/slides/slide6.xml><?xml version="1.0" encoding="utf-8"?>
+<p:sld xmlns:a="http://schemas.openxmlformats.org/drawingml/2006/main" xmlns:r="http://schemas.openxmlformats.org/officeDocument/2006/relationships" xmlns:p="http://schemas.openxmlformats.org/presentationml/2006/main">
+  <p:cSld>
+    <p:spTree>
+      <p:nvGrpSpPr>
+        <p:cNvPr id="1" name=""/>
+        <p:cNvGrpSpPr/>
+        <p:nvPr/>
+      </p:nvGrpSpPr>
+      <p:grpSpPr>
+        <a:xfrm>
+          <a:off x="0" y="0"/>
+          <a:ext cx="0" cy="0"/>
+          <a:chOff x="0" y="0"/>
+          <a:chExt cx="0" cy="0"/>
+        </a:xfrm>
+      </p:grpSpPr>
+      <p:sp>
+        <p:nvSpPr>
+          <p:cNvPr id="2" name="Title 1"/>
+          <p:cNvSpPr>
+            <a:spLocks noGrp="1"/>
+          </p:cNvSpPr>
+          <p:nvPr>
+            <p:ph type="title"/>
+          </p:nvPr>
+        </p:nvSpPr>
+        <p:spPr/>
+        <p:txBody>
+          <a:bodyPr/>
+          <a:lstStyle/>
+          <a:p>
+            <a:r>
+              <a:rPr lang="en-US" dirty="0" smtClean="0"/>
+              <a:t>Result</a:t>
+            </a:r>
+            <a:endParaRPr lang="en-US" dirty="0"/>
+          </a:p>
+        </p:txBody>
+      </p:sp>
+      <p:sp>
+        <p:nvSpPr>
+          <p:cNvPr id="3" name="Content Placeholder 2"/>
+          <p:cNvSpPr>
+            <a:spLocks noGrp="1"/>
+          </p:cNvSpPr>
+          <p:nvPr>
+            <p:ph idx="1"/>
+          </p:nvPr>
+        </p:nvSpPr>
+        <p:spPr/>
+        <p:txBody>
+          <a:bodyPr/>
+          <a:lstStyle/>
+          <a:p>
+            <a:r>
+              <a:rPr lang="en-US" dirty="0" smtClean="0"/>
+              <a:t>A multiple layers of dictionaries  </a:t>
+            </a:r>
+          </a:p>
+          <a:p>
+            <a:pPr lvl="1"/>
+            <a:r>
+              <a:rPr lang="en-US" dirty="0" smtClean="0"/>
+              <a:t>Key: note no e.g. 0,1,…,n</a:t>
+            </a:r>
+          </a:p>
+          <a:p>
+            <a:pPr lvl="1"/>
+            <a:r>
+              <a:rPr lang="en-US" dirty="0" smtClean="0"/>
+              <a:t>Value: a dictionary with a size of (total number of cancer type)+1</a:t>
+            </a:r>
+          </a:p>
+          <a:p>
+            <a:pPr lvl="2"/>
+            <a:r>
+              <a:rPr lang="en-US" dirty="0" smtClean="0"/>
+              <a:t>Key: Cancer type</a:t>
+            </a:r>
+          </a:p>
+          <a:p>
+            <a:pPr lvl="2"/>
+            <a:r>
+              <a:rPr lang="en-US" dirty="0" smtClean="0"/>
+              <a:t>ValueType1: a dictionary of data points and their value </a:t>
+            </a:r>
+          </a:p>
+          <a:p>
+            <a:pPr lvl="3"/>
+            <a:r>
+              <a:rPr lang="en-US" dirty="0"/>
+              <a:t>Key: data point</a:t>
+            </a:r>
+          </a:p>
+          <a:p>
+            <a:pPr lvl="3"/>
+            <a:r>
+              <a:rPr lang="en-US" dirty="0"/>
+              <a:t>Value: </a:t>
+            </a:r>
+            <a:r>
+              <a:rPr lang="en-US" dirty="0" smtClean="0"/>
+              <a:t>a list of value </a:t>
+            </a:r>
+            <a:r>
+              <a:rPr lang="en-US" dirty="0"/>
+              <a:t>corresponding to its data </a:t>
+            </a:r>
+            <a:r>
+              <a:rPr lang="en-US" dirty="0" smtClean="0"/>
+              <a:t>point and the original text</a:t>
+            </a:r>
+          </a:p>
+          <a:p>
+            <a:pPr lvl="2"/>
+            <a:r>
+              <a:rPr lang="en-US" dirty="0" smtClean="0"/>
+              <a:t>ValueType2:  </a:t>
+            </a:r>
+          </a:p>
+          <a:p>
+            <a:pPr lvl="3"/>
+            <a:r>
+              <a:rPr lang="en-US" dirty="0" smtClean="0"/>
+              <a:t>Key: “content”</a:t>
+            </a:r>
+          </a:p>
+          <a:p>
+            <a:pPr lvl="3"/>
+            <a:r>
+              <a:rPr lang="en-US" dirty="0" smtClean="0"/>
+              <a:t>Value: the remaining content in the note that have not been processed</a:t>
+            </a:r>
+          </a:p>
+        </p:txBody>
+      </p:sp>
+    </p:spTree>
+    <p:extLst>
+      <p:ext uri="{BB962C8B-B14F-4D97-AF65-F5344CB8AC3E}">
+        <p14:creationId xmlns:p14="http://schemas.microsoft.com/office/powerpoint/2010/main" val="3477313794"/>
+      </p:ext>
+    </p:extLst>
+  </p:cSld>
+  <p:clrMapOvr>
+    <a:masterClrMapping/>
+  </p:clrMapOvr>
+  <p:timing>
+    <p:tnLst>
+      <p:par>
+        <p:cTn id="1" dur="indefinite" restart="never" nodeType="tmRoot"/>
+      </p:par>
+    </p:tnLst>
+  </p:timing>
+</p:sld>
+</file>
+
+<file path=ppt/slides/slide7.xml><?xml version="1.0" encoding="utf-8"?>
+<p:sld xmlns:a="http://schemas.openxmlformats.org/drawingml/2006/main" xmlns:r="http://schemas.openxmlformats.org/officeDocument/2006/relationships" xmlns:p="http://schemas.openxmlformats.org/presentationml/2006/main">
+  <p:cSld>
+    <p:spTree>
+      <p:nvGrpSpPr>
+        <p:cNvPr id="1" name=""/>
+        <p:cNvGrpSpPr/>
+        <p:nvPr/>
+      </p:nvGrpSpPr>
+      <p:grpSpPr>
+        <a:xfrm>
+          <a:off x="0" y="0"/>
+          <a:ext cx="0" cy="0"/>
+          <a:chOff x="0" y="0"/>
+          <a:chExt cx="0" cy="0"/>
+        </a:xfrm>
+      </p:grpSpPr>
+      <p:sp>
+        <p:nvSpPr>
+          <p:cNvPr id="2" name="Title 1"/>
+          <p:cNvSpPr>
+            <a:spLocks noGrp="1"/>
+          </p:cNvSpPr>
+          <p:nvPr>
+            <p:ph type="title"/>
+          </p:nvPr>
+        </p:nvSpPr>
+        <p:spPr/>
+        <p:txBody>
+          <a:bodyPr/>
+          <a:lstStyle/>
+          <a:p>
+            <a:r>
+              <a:rPr lang="en-US" dirty="0" smtClean="0"/>
+              <a:t>Result</a:t>
+            </a:r>
+            <a:endParaRPr lang="en-US" dirty="0"/>
+          </a:p>
+        </p:txBody>
+      </p:sp>
+      <p:pic>
+        <p:nvPicPr>
+          <p:cNvPr id="4" name="Content Placeholder 3"/>
+          <p:cNvPicPr>
+            <a:picLocks noGrp="1" noChangeAspect="1"/>
+          </p:cNvPicPr>
+          <p:nvPr>
+            <p:ph idx="1"/>
+          </p:nvPr>
+        </p:nvPicPr>
+        <p:blipFill>
+          <a:blip r:embed="rId2"/>
+          <a:stretch>
+            <a:fillRect/>
+          </a:stretch>
+        </p:blipFill>
+        <p:spPr>
+          <a:xfrm>
+            <a:off x="315577" y="1554163"/>
+            <a:ext cx="4486275" cy="3181350"/>
+          </a:xfrm>
+          <a:prstGeom prst="rect">
+            <a:avLst/>
+          </a:prstGeom>
+        </p:spPr>
+      </p:pic>
+      <p:pic>
+        <p:nvPicPr>
+          <p:cNvPr id="5" name="Picture 4"/>
+          <p:cNvPicPr>
+            <a:picLocks noChangeAspect="1"/>
+          </p:cNvPicPr>
+          <p:nvPr/>
+        </p:nvPicPr>
+        <p:blipFill>
+          <a:blip r:embed="rId3"/>
+          <a:stretch>
+            <a:fillRect/>
+          </a:stretch>
+        </p:blipFill>
+        <p:spPr>
+          <a:xfrm>
+            <a:off x="678653" y="5251283"/>
+            <a:ext cx="4476750" cy="885825"/>
+          </a:xfrm>
+          <a:prstGeom prst="rect">
+            <a:avLst/>
+          </a:prstGeom>
+        </p:spPr>
+      </p:pic>
+      <p:pic>
+        <p:nvPicPr>
+          <p:cNvPr id="7" name="Picture 6"/>
+          <p:cNvPicPr>
+            <a:picLocks noChangeAspect="1"/>
+          </p:cNvPicPr>
+          <p:nvPr/>
+        </p:nvPicPr>
+        <p:blipFill>
+          <a:blip r:embed="rId4"/>
+          <a:stretch>
+            <a:fillRect/>
+          </a:stretch>
+        </p:blipFill>
+        <p:spPr>
+          <a:xfrm>
+            <a:off x="6398540" y="3492583"/>
+            <a:ext cx="4448175" cy="828675"/>
+          </a:xfrm>
+          <a:prstGeom prst="rect">
+            <a:avLst/>
+          </a:prstGeom>
+        </p:spPr>
+      </p:pic>
+      <p:pic>
+        <p:nvPicPr>
+          <p:cNvPr id="9" name="Picture 8"/>
+          <p:cNvPicPr>
+            <a:picLocks noChangeAspect="1"/>
+          </p:cNvPicPr>
+          <p:nvPr/>
+        </p:nvPicPr>
+        <p:blipFill>
+          <a:blip r:embed="rId5"/>
+          <a:stretch>
+            <a:fillRect/>
+          </a:stretch>
+        </p:blipFill>
+        <p:spPr>
+          <a:xfrm>
+            <a:off x="5155403" y="1951580"/>
+            <a:ext cx="6934451" cy="1381125"/>
+          </a:xfrm>
+          <a:prstGeom prst="rect">
+            <a:avLst/>
+          </a:prstGeom>
+        </p:spPr>
+      </p:pic>
+      <p:pic>
+        <p:nvPicPr>
+          <p:cNvPr id="10" name="Picture 9"/>
+          <p:cNvPicPr>
+            <a:picLocks noChangeAspect="1"/>
+          </p:cNvPicPr>
+          <p:nvPr/>
+        </p:nvPicPr>
+        <p:blipFill>
+          <a:blip r:embed="rId6"/>
+          <a:stretch>
+            <a:fillRect/>
+          </a:stretch>
+        </p:blipFill>
+        <p:spPr>
+          <a:xfrm>
+            <a:off x="6574256" y="4975059"/>
+            <a:ext cx="4457700" cy="1438275"/>
+          </a:xfrm>
+          <a:prstGeom prst="rect">
+            <a:avLst/>
+          </a:prstGeom>
+        </p:spPr>
+      </p:pic>
+      <p:cxnSp>
+        <p:nvCxnSpPr>
+          <p:cNvPr id="12" name="Straight Arrow Connector 11"/>
+          <p:cNvCxnSpPr/>
+          <p:nvPr/>
+        </p:nvCxnSpPr>
+        <p:spPr>
+          <a:xfrm>
+            <a:off x="2406316" y="4735513"/>
+            <a:ext cx="0" cy="426034"/>
+          </a:xfrm>
+          <a:prstGeom prst="straightConnector1">
+            <a:avLst/>
+          </a:prstGeom>
+          <a:ln>
+            <a:tailEnd type="triangle"/>
+          </a:ln>
+        </p:spPr>
+        <p:style>
+          <a:lnRef idx="1">
+            <a:schemeClr val="dk1"/>
+          </a:lnRef>
+          <a:fillRef idx="0">
+            <a:schemeClr val="dk1"/>
+          </a:fillRef>
+          <a:effectRef idx="0">
+            <a:schemeClr val="dk1"/>
+          </a:effectRef>
+          <a:fontRef idx="minor">
+            <a:schemeClr val="tx1"/>
+          </a:fontRef>
+        </p:style>
+      </p:cxnSp>
+      <p:sp>
+        <p:nvSpPr>
+          <p:cNvPr id="14" name="Rectangle 13"/>
+          <p:cNvSpPr/>
+          <p:nvPr/>
+        </p:nvSpPr>
+        <p:spPr>
+          <a:xfrm>
+            <a:off x="480132" y="5462337"/>
+            <a:ext cx="4873792" cy="360947"/>
+          </a:xfrm>
+          <a:prstGeom prst="rect">
+            <a:avLst/>
+          </a:prstGeom>
+          <a:noFill/>
+          <a:ln w="38100"/>
+        </p:spPr>
+        <p:style>
+          <a:lnRef idx="2">
+            <a:schemeClr val="accent5"/>
+          </a:lnRef>
+          <a:fillRef idx="1">
+            <a:schemeClr val="lt1"/>
+          </a:fillRef>
+          <a:effectRef idx="0">
+            <a:schemeClr val="accent5"/>
+          </a:effectRef>
+          <a:fontRef idx="minor">
+            <a:schemeClr val="dk1"/>
+          </a:fontRef>
+        </p:style>
+        <p:txBody>
+          <a:bodyPr rtlCol="0" anchor="ctr"/>
+          <a:lstStyle/>
+          <a:p>
+            <a:pPr algn="ctr"/>
+            <a:endParaRPr lang="en-US"/>
+          </a:p>
+        </p:txBody>
+      </p:sp>
+      <p:sp>
+        <p:nvSpPr>
+          <p:cNvPr id="15" name="Rectangle 14"/>
+          <p:cNvSpPr/>
+          <p:nvPr/>
+        </p:nvSpPr>
+        <p:spPr>
+          <a:xfrm>
+            <a:off x="4976060" y="1780424"/>
+            <a:ext cx="7113793" cy="2697914"/>
+          </a:xfrm>
+          <a:prstGeom prst="rect">
+            <a:avLst/>
+          </a:prstGeom>
+          <a:noFill/>
+          <a:ln w="38100"/>
+        </p:spPr>
+        <p:style>
+          <a:lnRef idx="2">
+            <a:schemeClr val="accent5"/>
+          </a:lnRef>
+          <a:fillRef idx="1">
+            <a:schemeClr val="lt1"/>
+          </a:fillRef>
+          <a:effectRef idx="0">
+            <a:schemeClr val="accent5"/>
+          </a:effectRef>
+          <a:fontRef idx="minor">
+            <a:schemeClr val="dk1"/>
+          </a:fontRef>
+        </p:style>
+        <p:txBody>
+          <a:bodyPr rtlCol="0" anchor="ctr"/>
+          <a:lstStyle/>
+          <a:p>
+            <a:pPr algn="ctr"/>
+            <a:endParaRPr lang="en-US"/>
+          </a:p>
+        </p:txBody>
+      </p:sp>
+      <p:cxnSp>
+        <p:nvCxnSpPr>
+          <p:cNvPr id="17" name="Straight Arrow Connector 16"/>
+          <p:cNvCxnSpPr/>
+          <p:nvPr/>
+        </p:nvCxnSpPr>
+        <p:spPr>
+          <a:xfrm flipV="1">
+            <a:off x="4801852" y="4511842"/>
+            <a:ext cx="600327" cy="950495"/>
+          </a:xfrm>
+          <a:prstGeom prst="straightConnector1">
+            <a:avLst/>
+          </a:prstGeom>
+          <a:ln>
+            <a:solidFill>
+              <a:schemeClr val="accent1">
+                <a:lumMod val="75000"/>
+              </a:schemeClr>
+            </a:solidFill>
+            <a:tailEnd type="triangle"/>
+          </a:ln>
+        </p:spPr>
+        <p:style>
+          <a:lnRef idx="1">
+            <a:schemeClr val="accent1"/>
+          </a:lnRef>
+          <a:fillRef idx="0">
+            <a:schemeClr val="accent1"/>
+          </a:fillRef>
+          <a:effectRef idx="0">
+            <a:schemeClr val="accent1"/>
+          </a:effectRef>
+          <a:fontRef idx="minor">
+            <a:schemeClr val="tx1"/>
+          </a:fontRef>
+        </p:style>
+      </p:cxnSp>
+      <p:sp>
+        <p:nvSpPr>
+          <p:cNvPr id="18" name="Rectangle 17"/>
+          <p:cNvSpPr/>
+          <p:nvPr/>
+        </p:nvSpPr>
+        <p:spPr>
+          <a:xfrm>
+            <a:off x="480132" y="5809665"/>
+            <a:ext cx="4873792" cy="360947"/>
+          </a:xfrm>
+          <a:prstGeom prst="rect">
+            <a:avLst/>
+          </a:prstGeom>
+          <a:noFill/>
+          <a:ln w="38100">
+            <a:solidFill>
+              <a:srgbClr val="FF0000"/>
+            </a:solidFill>
+          </a:ln>
+        </p:spPr>
+        <p:style>
+          <a:lnRef idx="2">
+            <a:schemeClr val="accent5"/>
+          </a:lnRef>
+          <a:fillRef idx="1">
+            <a:schemeClr val="lt1"/>
+          </a:fillRef>
+          <a:effectRef idx="0">
+            <a:schemeClr val="accent5"/>
+          </a:effectRef>
+          <a:fontRef idx="minor">
+            <a:schemeClr val="dk1"/>
+          </a:fontRef>
+        </p:style>
+        <p:txBody>
+          <a:bodyPr rtlCol="0" anchor="ctr"/>
+          <a:lstStyle/>
+          <a:p>
+            <a:pPr algn="ctr"/>
+            <a:endParaRPr lang="en-US"/>
+          </a:p>
+        </p:txBody>
+      </p:sp>
+      <p:sp>
+        <p:nvSpPr>
+          <p:cNvPr id="19" name="Rectangle 18"/>
+          <p:cNvSpPr/>
+          <p:nvPr/>
+        </p:nvSpPr>
+        <p:spPr>
+          <a:xfrm>
+            <a:off x="6366210" y="4942013"/>
+            <a:ext cx="4873792" cy="1579103"/>
+          </a:xfrm>
+          <a:prstGeom prst="rect">
+            <a:avLst/>
+          </a:prstGeom>
+          <a:noFill/>
+          <a:ln w="38100">
+            <a:solidFill>
+              <a:srgbClr val="FF0000"/>
+            </a:solidFill>
+          </a:ln>
+        </p:spPr>
+        <p:style>
+          <a:lnRef idx="2">
+            <a:schemeClr val="accent5"/>
+          </a:lnRef>
+          <a:fillRef idx="1">
+            <a:schemeClr val="lt1"/>
+          </a:fillRef>
+          <a:effectRef idx="0">
+            <a:schemeClr val="accent5"/>
+          </a:effectRef>
+          <a:fontRef idx="minor">
+            <a:schemeClr val="dk1"/>
+          </a:fontRef>
+        </p:style>
+        <p:txBody>
+          <a:bodyPr rtlCol="0" anchor="ctr"/>
+          <a:lstStyle/>
+          <a:p>
+            <a:pPr algn="ctr"/>
+            <a:endParaRPr lang="en-US"/>
+          </a:p>
+        </p:txBody>
+      </p:sp>
+      <p:cxnSp>
+        <p:nvCxnSpPr>
+          <p:cNvPr id="21" name="Straight Arrow Connector 20"/>
+          <p:cNvCxnSpPr>
+            <a:stCxn id="18" idx="3"/>
+          </p:cNvCxnSpPr>
+          <p:nvPr/>
+        </p:nvCxnSpPr>
+        <p:spPr>
+          <a:xfrm flipV="1">
+            <a:off x="5353924" y="5988761"/>
+            <a:ext cx="926560" cy="1378"/>
+          </a:xfrm>
+          <a:prstGeom prst="straightConnector1">
+            <a:avLst/>
+          </a:prstGeom>
+          <a:ln>
+            <a:solidFill>
+              <a:srgbClr val="FF0000"/>
+            </a:solidFill>
+            <a:tailEnd type="triangle"/>
+          </a:ln>
+        </p:spPr>
+        <p:style>
+          <a:lnRef idx="1">
+            <a:schemeClr val="accent1"/>
+          </a:lnRef>
+          <a:fillRef idx="0">
+            <a:schemeClr val="accent1"/>
+          </a:fillRef>
+          <a:effectRef idx="0">
+            <a:schemeClr val="accent1"/>
+          </a:effectRef>
+          <a:fontRef idx="minor">
+            <a:schemeClr val="tx1"/>
+          </a:fontRef>
+        </p:style>
+      </p:cxnSp>
+      <p:sp>
+        <p:nvSpPr>
+          <p:cNvPr id="23" name="Rectangle 22"/>
+          <p:cNvSpPr/>
+          <p:nvPr/>
+        </p:nvSpPr>
+        <p:spPr>
+          <a:xfrm>
+            <a:off x="9745579" y="2461669"/>
+            <a:ext cx="2225842" cy="269500"/>
+          </a:xfrm>
+          <a:prstGeom prst="rect">
+            <a:avLst/>
+          </a:prstGeom>
+          <a:noFill/>
+          <a:ln w="38100">
+            <a:solidFill>
+              <a:schemeClr val="accent6"/>
+            </a:solidFill>
+          </a:ln>
+        </p:spPr>
+        <p:style>
+          <a:lnRef idx="2">
+            <a:schemeClr val="accent5"/>
+          </a:lnRef>
+          <a:fillRef idx="1">
+            <a:schemeClr val="lt1"/>
+          </a:fillRef>
+          <a:effectRef idx="0">
+            <a:schemeClr val="accent5"/>
+          </a:effectRef>
+          <a:fontRef idx="minor">
+            <a:schemeClr val="dk1"/>
+          </a:fontRef>
+        </p:style>
+        <p:txBody>
+          <a:bodyPr rtlCol="0" anchor="ctr"/>
+          <a:lstStyle/>
+          <a:p>
+            <a:pPr algn="ctr"/>
+            <a:endParaRPr lang="en-US"/>
+          </a:p>
+        </p:txBody>
+      </p:sp>
+      <p:sp>
+        <p:nvSpPr>
+          <p:cNvPr id="24" name="Rectangle 23"/>
+          <p:cNvSpPr/>
+          <p:nvPr/>
+        </p:nvSpPr>
+        <p:spPr>
+          <a:xfrm>
+            <a:off x="6224331" y="3353716"/>
+            <a:ext cx="4807625" cy="1052430"/>
+          </a:xfrm>
+          <a:prstGeom prst="rect">
+            <a:avLst/>
+          </a:prstGeom>
+          <a:noFill/>
+          <a:ln w="38100">
+            <a:solidFill>
+              <a:schemeClr val="accent6"/>
+            </a:solidFill>
+          </a:ln>
+        </p:spPr>
+        <p:style>
+          <a:lnRef idx="2">
+            <a:schemeClr val="accent5"/>
+          </a:lnRef>
+          <a:fillRef idx="1">
+            <a:schemeClr val="lt1"/>
+          </a:fillRef>
+          <a:effectRef idx="0">
+            <a:schemeClr val="accent5"/>
+          </a:effectRef>
+          <a:fontRef idx="minor">
+            <a:schemeClr val="dk1"/>
+          </a:fontRef>
+        </p:style>
+        <p:txBody>
+          <a:bodyPr rtlCol="0" anchor="ctr"/>
+          <a:lstStyle/>
+          <a:p>
+            <a:pPr algn="ctr"/>
+            <a:endParaRPr lang="en-US"/>
+          </a:p>
+        </p:txBody>
+      </p:sp>
+      <p:cxnSp>
+        <p:nvCxnSpPr>
+          <p:cNvPr id="32" name="Straight Arrow Connector 31"/>
+          <p:cNvCxnSpPr/>
+          <p:nvPr/>
+        </p:nvCxnSpPr>
+        <p:spPr>
+          <a:xfrm flipH="1">
+            <a:off x="11153274" y="2820905"/>
+            <a:ext cx="200526" cy="457158"/>
+          </a:xfrm>
+          <a:prstGeom prst="straightConnector1">
+            <a:avLst/>
+          </a:prstGeom>
+          <a:ln>
+            <a:solidFill>
+              <a:schemeClr val="accent6"/>
+            </a:solidFill>
+            <a:tailEnd type="triangle"/>
+          </a:ln>
+        </p:spPr>
+        <p:style>
+          <a:lnRef idx="1">
+            <a:schemeClr val="accent1"/>
+          </a:lnRef>
+          <a:fillRef idx="0">
+            <a:schemeClr val="accent1"/>
+          </a:fillRef>
+          <a:effectRef idx="0">
+            <a:schemeClr val="accent1"/>
+          </a:effectRef>
+          <a:fontRef idx="minor">
+            <a:schemeClr val="tx1"/>
+          </a:fontRef>
+        </p:style>
+      </p:cxnSp>
+    </p:spTree>
+    <p:extLst>
+      <p:ext uri="{BB962C8B-B14F-4D97-AF65-F5344CB8AC3E}">
+        <p14:creationId xmlns:p14="http://schemas.microsoft.com/office/powerpoint/2010/main" val="89797108"/>
+      </p:ext>
+    </p:extLst>
+  </p:cSld>
+  <p:clrMapOvr>
+    <a:masterClrMapping/>
+  </p:clrMapOvr>
+  <p:timing>
+    <p:tnLst>
+      <p:par>
+        <p:cTn id="1" dur="indefinite" restart="never" nodeType="tmRoot"/>
+      </p:par>
+    </p:tnLst>
+  </p:timing>
+</p:sld>
+</file>
+
 <file path=ppt/theme/theme1.xml><?xml version="1.0" encoding="utf-8"?>
 <a:theme xmlns:a="http://schemas.openxmlformats.org/drawingml/2006/main" name="Office Theme">
   <a:themeElements>

</xml_diff>

<commit_message>
added value confidence functions_needs testing
</commit_message>
<xml_diff>
--- a/Extracting Data points_powerpoint.pptx
+++ b/Extracting Data points_powerpoint.pptx
@@ -12,6 +12,7 @@
     <p:sldId id="260" r:id="rId6"/>
     <p:sldId id="261" r:id="rId7"/>
     <p:sldId id="262" r:id="rId8"/>
+    <p:sldId id="263" r:id="rId9"/>
   </p:sldIdLst>
   <p:sldSz cx="12192000" cy="6858000"/>
   <p:notesSz cx="6858000" cy="9144000"/>
@@ -4297,6 +4298,94 @@
 </p:sld>
 </file>
 
+<file path=ppt/slides/slide8.xml><?xml version="1.0" encoding="utf-8"?>
+<p:sld xmlns:a="http://schemas.openxmlformats.org/drawingml/2006/main" xmlns:r="http://schemas.openxmlformats.org/officeDocument/2006/relationships" xmlns:p="http://schemas.openxmlformats.org/presentationml/2006/main">
+  <p:cSld>
+    <p:spTree>
+      <p:nvGrpSpPr>
+        <p:cNvPr id="1" name=""/>
+        <p:cNvGrpSpPr/>
+        <p:nvPr/>
+      </p:nvGrpSpPr>
+      <p:grpSpPr>
+        <a:xfrm>
+          <a:off x="0" y="0"/>
+          <a:ext cx="0" cy="0"/>
+          <a:chOff x="0" y="0"/>
+          <a:chExt cx="0" cy="0"/>
+        </a:xfrm>
+      </p:grpSpPr>
+      <p:sp>
+        <p:nvSpPr>
+          <p:cNvPr id="2" name="Title 1"/>
+          <p:cNvSpPr>
+            <a:spLocks noGrp="1"/>
+          </p:cNvSpPr>
+          <p:nvPr>
+            <p:ph type="title"/>
+          </p:nvPr>
+        </p:nvSpPr>
+        <p:spPr/>
+        <p:txBody>
+          <a:bodyPr/>
+          <a:lstStyle/>
+          <a:p>
+            <a:r>
+              <a:rPr lang="en-US" dirty="0" smtClean="0"/>
+              <a:t>Proposed work</a:t>
+            </a:r>
+            <a:endParaRPr lang="en-US" dirty="0"/>
+          </a:p>
+        </p:txBody>
+      </p:sp>
+      <p:sp>
+        <p:nvSpPr>
+          <p:cNvPr id="3" name="Content Placeholder 2"/>
+          <p:cNvSpPr>
+            <a:spLocks noGrp="1"/>
+          </p:cNvSpPr>
+          <p:nvPr>
+            <p:ph idx="1"/>
+          </p:nvPr>
+        </p:nvSpPr>
+        <p:spPr/>
+        <p:txBody>
+          <a:bodyPr/>
+          <a:lstStyle/>
+          <a:p>
+            <a:r>
+              <a:rPr lang="en-US" dirty="0" smtClean="0"/>
+              <a:t>Automatically calculate confident score for each value extracted</a:t>
+            </a:r>
+          </a:p>
+          <a:p>
+            <a:r>
+              <a:rPr lang="en-US" dirty="0" smtClean="0"/>
+              <a:t>Apply to each cancer type and each data point separately</a:t>
+            </a:r>
+          </a:p>
+          <a:p>
+            <a:r>
+              <a:rPr lang="en-US" dirty="0" smtClean="0"/>
+              <a:t>Based on type of text, frequency, length of text,… </a:t>
+            </a:r>
+            <a:endParaRPr lang="en-US" dirty="0"/>
+          </a:p>
+        </p:txBody>
+      </p:sp>
+    </p:spTree>
+    <p:extLst>
+      <p:ext uri="{BB962C8B-B14F-4D97-AF65-F5344CB8AC3E}">
+        <p14:creationId xmlns:p14="http://schemas.microsoft.com/office/powerpoint/2010/main" val="420855085"/>
+      </p:ext>
+    </p:extLst>
+  </p:cSld>
+  <p:clrMapOvr>
+    <a:masterClrMapping/>
+  </p:clrMapOvr>
+</p:sld>
+</file>
+
 <file path=ppt/theme/theme1.xml><?xml version="1.0" encoding="utf-8"?>
 <a:theme xmlns:a="http://schemas.openxmlformats.org/drawingml/2006/main" name="Office Theme">
   <a:themeElements>

</xml_diff>

<commit_message>
Added web component to the project
</commit_message>
<xml_diff>
--- a/Extracting Data points_powerpoint.pptx
+++ b/Extracting Data points_powerpoint.pptx
@@ -6,13 +6,14 @@
   </p:sldMasterIdLst>
   <p:sldIdLst>
     <p:sldId id="256" r:id="rId2"/>
-    <p:sldId id="257" r:id="rId3"/>
-    <p:sldId id="258" r:id="rId4"/>
-    <p:sldId id="259" r:id="rId5"/>
-    <p:sldId id="260" r:id="rId6"/>
-    <p:sldId id="261" r:id="rId7"/>
-    <p:sldId id="262" r:id="rId8"/>
-    <p:sldId id="263" r:id="rId9"/>
+    <p:sldId id="264" r:id="rId3"/>
+    <p:sldId id="257" r:id="rId4"/>
+    <p:sldId id="258" r:id="rId5"/>
+    <p:sldId id="259" r:id="rId6"/>
+    <p:sldId id="260" r:id="rId7"/>
+    <p:sldId id="261" r:id="rId8"/>
+    <p:sldId id="262" r:id="rId9"/>
+    <p:sldId id="263" r:id="rId10"/>
   </p:sldIdLst>
   <p:sldSz cx="12192000" cy="6858000"/>
   <p:notesSz cx="6858000" cy="9144000"/>
@@ -250,7 +251,7 @@
           <a:p>
             <a:fld id="{7DC00FD3-F37A-4112-A7E3-59ABF1E0E8D0}" type="datetimeFigureOut">
               <a:rPr lang="en-US" smtClean="0"/>
-              <a:t>7/29/2015</a:t>
+              <a:t>8/5/2015</a:t>
             </a:fld>
             <a:endParaRPr lang="en-US"/>
           </a:p>
@@ -420,7 +421,7 @@
           <a:p>
             <a:fld id="{7DC00FD3-F37A-4112-A7E3-59ABF1E0E8D0}" type="datetimeFigureOut">
               <a:rPr lang="en-US" smtClean="0"/>
-              <a:t>7/29/2015</a:t>
+              <a:t>8/5/2015</a:t>
             </a:fld>
             <a:endParaRPr lang="en-US"/>
           </a:p>
@@ -600,7 +601,7 @@
           <a:p>
             <a:fld id="{7DC00FD3-F37A-4112-A7E3-59ABF1E0E8D0}" type="datetimeFigureOut">
               <a:rPr lang="en-US" smtClean="0"/>
-              <a:t>7/29/2015</a:t>
+              <a:t>8/5/2015</a:t>
             </a:fld>
             <a:endParaRPr lang="en-US"/>
           </a:p>
@@ -770,7 +771,7 @@
           <a:p>
             <a:fld id="{7DC00FD3-F37A-4112-A7E3-59ABF1E0E8D0}" type="datetimeFigureOut">
               <a:rPr lang="en-US" smtClean="0"/>
-              <a:t>7/29/2015</a:t>
+              <a:t>8/5/2015</a:t>
             </a:fld>
             <a:endParaRPr lang="en-US"/>
           </a:p>
@@ -1016,7 +1017,7 @@
           <a:p>
             <a:fld id="{7DC00FD3-F37A-4112-A7E3-59ABF1E0E8D0}" type="datetimeFigureOut">
               <a:rPr lang="en-US" smtClean="0"/>
-              <a:t>7/29/2015</a:t>
+              <a:t>8/5/2015</a:t>
             </a:fld>
             <a:endParaRPr lang="en-US"/>
           </a:p>
@@ -1248,7 +1249,7 @@
           <a:p>
             <a:fld id="{7DC00FD3-F37A-4112-A7E3-59ABF1E0E8D0}" type="datetimeFigureOut">
               <a:rPr lang="en-US" smtClean="0"/>
-              <a:t>7/29/2015</a:t>
+              <a:t>8/5/2015</a:t>
             </a:fld>
             <a:endParaRPr lang="en-US"/>
           </a:p>
@@ -1615,7 +1616,7 @@
           <a:p>
             <a:fld id="{7DC00FD3-F37A-4112-A7E3-59ABF1E0E8D0}" type="datetimeFigureOut">
               <a:rPr lang="en-US" smtClean="0"/>
-              <a:t>7/29/2015</a:t>
+              <a:t>8/5/2015</a:t>
             </a:fld>
             <a:endParaRPr lang="en-US"/>
           </a:p>
@@ -1733,7 +1734,7 @@
           <a:p>
             <a:fld id="{7DC00FD3-F37A-4112-A7E3-59ABF1E0E8D0}" type="datetimeFigureOut">
               <a:rPr lang="en-US" smtClean="0"/>
-              <a:t>7/29/2015</a:t>
+              <a:t>8/5/2015</a:t>
             </a:fld>
             <a:endParaRPr lang="en-US"/>
           </a:p>
@@ -1828,7 +1829,7 @@
           <a:p>
             <a:fld id="{7DC00FD3-F37A-4112-A7E3-59ABF1E0E8D0}" type="datetimeFigureOut">
               <a:rPr lang="en-US" smtClean="0"/>
-              <a:t>7/29/2015</a:t>
+              <a:t>8/5/2015</a:t>
             </a:fld>
             <a:endParaRPr lang="en-US"/>
           </a:p>
@@ -2105,7 +2106,7 @@
           <a:p>
             <a:fld id="{7DC00FD3-F37A-4112-A7E3-59ABF1E0E8D0}" type="datetimeFigureOut">
               <a:rPr lang="en-US" smtClean="0"/>
-              <a:t>7/29/2015</a:t>
+              <a:t>8/5/2015</a:t>
             </a:fld>
             <a:endParaRPr lang="en-US"/>
           </a:p>
@@ -2358,7 +2359,7 @@
           <a:p>
             <a:fld id="{7DC00FD3-F37A-4112-A7E3-59ABF1E0E8D0}" type="datetimeFigureOut">
               <a:rPr lang="en-US" smtClean="0"/>
-              <a:t>7/29/2015</a:t>
+              <a:t>8/5/2015</a:t>
             </a:fld>
             <a:endParaRPr lang="en-US"/>
           </a:p>
@@ -2571,7 +2572,7 @@
           <a:p>
             <a:fld id="{7DC00FD3-F37A-4112-A7E3-59ABF1E0E8D0}" type="datetimeFigureOut">
               <a:rPr lang="en-US" smtClean="0"/>
-              <a:t>7/29/2015</a:t>
+              <a:t>8/5/2015</a:t>
             </a:fld>
             <a:endParaRPr lang="en-US"/>
           </a:p>
@@ -3014,10 +3015,6 @@
           <a:bodyPr/>
           <a:lstStyle/>
           <a:p>
-            <a:r>
-              <a:rPr lang="en-US" dirty="0" smtClean="0"/>
-              <a:t>Jul 28, 2015</a:t>
-            </a:r>
             <a:endParaRPr lang="en-US" dirty="0"/>
           </a:p>
         </p:txBody>
@@ -3069,7 +3066,7 @@
           <a:p>
             <a:r>
               <a:rPr lang="en-US" dirty="0" smtClean="0"/>
-              <a:t>Overview</a:t>
+              <a:t>Some results</a:t>
             </a:r>
             <a:endParaRPr lang="en-US" dirty="0"/>
           </a:p>
@@ -3085,32 +3082,1121 @@
             <p:ph idx="1"/>
           </p:nvPr>
         </p:nvSpPr>
-        <p:spPr/>
-        <p:txBody>
-          <a:bodyPr/>
-          <a:lstStyle/>
-          <a:p>
-            <a:r>
-              <a:rPr lang="en-US" dirty="0" smtClean="0"/>
-              <a:t>Objective: Extracting data points and corresponding values contained in the note</a:t>
-            </a:r>
-          </a:p>
-          <a:p>
-            <a:r>
-              <a:rPr lang="en-US" dirty="0" smtClean="0"/>
-              <a:t>Input: Structured pathology note</a:t>
-            </a:r>
-          </a:p>
-          <a:p>
-            <a:r>
-              <a:rPr lang="en-US" dirty="0" smtClean="0"/>
-              <a:t>Algorithm: Regular Expression, Rule-based </a:t>
-            </a:r>
-          </a:p>
-          <a:p>
-            <a:r>
-              <a:rPr lang="en-US" dirty="0" smtClean="0"/>
-              <a:t>Output: Cancer types, data points and values  </a:t>
+        <p:spPr>
+          <a:xfrm>
+            <a:off x="838200" y="1481261"/>
+            <a:ext cx="10515600" cy="4351338"/>
+          </a:xfrm>
+        </p:spPr>
+        <p:txBody>
+          <a:bodyPr>
+            <a:noAutofit/>
+          </a:bodyPr>
+          <a:lstStyle/>
+          <a:p>
+            <a:pPr marL="0" indent="0">
+              <a:buNone/>
+            </a:pPr>
+            <a:r>
+              <a:rPr lang="en-US" sz="1100" dirty="0"/>
+              <a:t> Skin Cancer Staging Summary 	</a:t>
+            </a:r>
+          </a:p>
+          <a:p>
+            <a:pPr marL="0" indent="0">
+              <a:buNone/>
+            </a:pPr>
+            <a:r>
+              <a:rPr lang="en-US" sz="1100" dirty="0">
+                <a:solidFill>
+                  <a:srgbClr val="FFFF00"/>
+                </a:solidFill>
+              </a:rPr>
+              <a:t>Anatomic Site of Tumor:	left auricle of ear</a:t>
+            </a:r>
+            <a:r>
+              <a:rPr lang="en-US" sz="1100" dirty="0"/>
+              <a:t>	</a:t>
+            </a:r>
+          </a:p>
+          <a:p>
+            <a:pPr marL="0" indent="0">
+              <a:buNone/>
+            </a:pPr>
+            <a:r>
+              <a:rPr lang="en-US" sz="1100" dirty="0">
+                <a:solidFill>
+                  <a:srgbClr val="002060"/>
+                </a:solidFill>
+              </a:rPr>
+              <a:t>Depth of Invasion:	deep dermis to level of cartilage</a:t>
+            </a:r>
+            <a:r>
+              <a:rPr lang="en-US" sz="1100" dirty="0"/>
+              <a:t>	</a:t>
+            </a:r>
+          </a:p>
+          <a:p>
+            <a:pPr marL="0" indent="0">
+              <a:buNone/>
+            </a:pPr>
+            <a:r>
+              <a:rPr lang="en-US" sz="1100" dirty="0">
+                <a:solidFill>
+                  <a:schemeClr val="accent6"/>
+                </a:solidFill>
+              </a:rPr>
+              <a:t>Histologic Type of Tumor	keratinizing squamous cell carcinoma	</a:t>
+            </a:r>
+          </a:p>
+          <a:p>
+            <a:pPr marL="0" indent="0">
+              <a:buNone/>
+            </a:pPr>
+            <a:r>
+              <a:rPr lang="en-US" sz="1100" dirty="0">
+                <a:solidFill>
+                  <a:schemeClr val="accent6"/>
+                </a:solidFill>
+              </a:rPr>
+              <a:t>	Size:	3.2 x 3 cm	</a:t>
+            </a:r>
+          </a:p>
+          <a:p>
+            <a:pPr marL="0" indent="0">
+              <a:buNone/>
+            </a:pPr>
+            <a:r>
+              <a:rPr lang="en-US" sz="1100" dirty="0">
+                <a:solidFill>
+                  <a:schemeClr val="accent6"/>
+                </a:solidFill>
+              </a:rPr>
+              <a:t>	Grade:	1-2 of 3	</a:t>
+            </a:r>
+          </a:p>
+          <a:p>
+            <a:pPr marL="0" indent="0">
+              <a:buNone/>
+            </a:pPr>
+            <a:r>
+              <a:rPr lang="en-US" sz="1100" dirty="0" err="1"/>
+              <a:t>Lymphovascular</a:t>
+            </a:r>
+            <a:r>
+              <a:rPr lang="en-US" sz="1100" dirty="0"/>
+              <a:t> Invasion:	not identified 	</a:t>
+            </a:r>
+          </a:p>
+          <a:p>
+            <a:pPr marL="0" indent="0">
+              <a:buNone/>
+            </a:pPr>
+            <a:r>
+              <a:rPr lang="en-US" sz="1100" dirty="0" err="1"/>
+              <a:t>Perineural</a:t>
+            </a:r>
+            <a:r>
+              <a:rPr lang="en-US" sz="1100" dirty="0"/>
+              <a:t> Invasion:	not identified	</a:t>
+            </a:r>
+          </a:p>
+          <a:p>
+            <a:pPr marL="0" indent="0">
+              <a:buNone/>
+            </a:pPr>
+            <a:r>
+              <a:rPr lang="en-US" sz="1100" dirty="0"/>
+              <a:t>Underlying Bone Invasion:		</a:t>
+            </a:r>
+          </a:p>
+          <a:p>
+            <a:pPr marL="0" indent="0">
+              <a:buNone/>
+            </a:pPr>
+            <a:r>
+              <a:rPr lang="en-US" sz="1100" dirty="0">
+                <a:solidFill>
+                  <a:schemeClr val="accent1"/>
+                </a:solidFill>
+              </a:rPr>
+              <a:t>Margins:	final margins clear</a:t>
+            </a:r>
+            <a:r>
+              <a:rPr lang="en-US" sz="1100" dirty="0"/>
+              <a:t>	</a:t>
+            </a:r>
+          </a:p>
+          <a:p>
+            <a:pPr marL="0" indent="0">
+              <a:buNone/>
+            </a:pPr>
+            <a:r>
+              <a:rPr lang="en-US" sz="1100" dirty="0">
+                <a:solidFill>
+                  <a:srgbClr val="FF0000"/>
+                </a:solidFill>
+              </a:rPr>
+              <a:t>Total Lymph Nodes:	zero</a:t>
+            </a:r>
+            <a:r>
+              <a:rPr lang="en-US" sz="1100" dirty="0"/>
+              <a:t>	</a:t>
+            </a:r>
+          </a:p>
+          <a:p>
+            <a:pPr marL="0" indent="0">
+              <a:buNone/>
+            </a:pPr>
+            <a:r>
+              <a:rPr lang="en-US" sz="1100" dirty="0"/>
+              <a:t>	</a:t>
+            </a:r>
+            <a:r>
+              <a:rPr lang="en-US" sz="1100" dirty="0">
+                <a:solidFill>
+                  <a:srgbClr val="FF0000"/>
+                </a:solidFill>
+              </a:rPr>
+              <a:t>Number of Positive:	_	</a:t>
+            </a:r>
+          </a:p>
+          <a:p>
+            <a:pPr marL="0" indent="0">
+              <a:buNone/>
+            </a:pPr>
+            <a:r>
+              <a:rPr lang="en-US" sz="1100" dirty="0"/>
+              <a:t>	</a:t>
+            </a:r>
+            <a:r>
+              <a:rPr lang="en-US" sz="1100" dirty="0">
+                <a:solidFill>
+                  <a:srgbClr val="FF0000"/>
+                </a:solidFill>
+              </a:rPr>
+              <a:t>Size of Longest Metastasis:	_ mm	</a:t>
+            </a:r>
+          </a:p>
+          <a:p>
+            <a:pPr marL="0" indent="0">
+              <a:buNone/>
+            </a:pPr>
+            <a:r>
+              <a:rPr lang="en-US" sz="1100" dirty="0">
+                <a:solidFill>
+                  <a:srgbClr val="FF0000"/>
+                </a:solidFill>
+              </a:rPr>
+              <a:t>	</a:t>
+            </a:r>
+            <a:r>
+              <a:rPr lang="en-US" sz="1100" dirty="0" err="1">
+                <a:solidFill>
+                  <a:srgbClr val="FF0000"/>
+                </a:solidFill>
+              </a:rPr>
+              <a:t>Extranodal</a:t>
+            </a:r>
+            <a:r>
+              <a:rPr lang="en-US" sz="1100" dirty="0">
+                <a:solidFill>
+                  <a:srgbClr val="FF0000"/>
+                </a:solidFill>
+              </a:rPr>
+              <a:t> Extension:	_	</a:t>
+            </a:r>
+          </a:p>
+          <a:p>
+            <a:pPr marL="0" indent="0">
+              <a:buNone/>
+            </a:pPr>
+            <a:r>
+              <a:rPr lang="en-US" sz="1100" dirty="0">
+                <a:solidFill>
+                  <a:srgbClr val="FF0000"/>
+                </a:solidFill>
+              </a:rPr>
+              <a:t>	Other Metastatic Sites	_ N/A</a:t>
+            </a:r>
+            <a:r>
+              <a:rPr lang="en-US" sz="1100" dirty="0"/>
+              <a:t>	</a:t>
+            </a:r>
+          </a:p>
+          <a:p>
+            <a:pPr marL="0" indent="0">
+              <a:buNone/>
+            </a:pPr>
+            <a:r>
+              <a:rPr lang="en-US" sz="1100" dirty="0"/>
+              <a:t>	</a:t>
+            </a:r>
+            <a:r>
+              <a:rPr lang="en-US" sz="1100" dirty="0" smtClean="0"/>
+              <a:t>	</a:t>
+            </a:r>
+          </a:p>
+        </p:txBody>
+      </p:sp>
+      <p:sp>
+        <p:nvSpPr>
+          <p:cNvPr id="5" name="Content Placeholder 2"/>
+          <p:cNvSpPr txBox="1">
+            <a:spLocks/>
+          </p:cNvSpPr>
+          <p:nvPr/>
+        </p:nvSpPr>
+        <p:spPr>
+          <a:xfrm>
+            <a:off x="5295083" y="1478279"/>
+            <a:ext cx="10515600" cy="4351338"/>
+          </a:xfrm>
+          <a:prstGeom prst="rect">
+            <a:avLst/>
+          </a:prstGeom>
+        </p:spPr>
+        <p:txBody>
+          <a:bodyPr vert="horz" lIns="91440" tIns="45720" rIns="91440" bIns="45720" rtlCol="0">
+            <a:normAutofit fontScale="55000" lnSpcReduction="20000"/>
+          </a:bodyPr>
+          <a:lstStyle>
+            <a:lvl1pPr marL="228600" indent="-228600" algn="l" defTabSz="914400" rtl="0" eaLnBrk="1" latinLnBrk="0" hangingPunct="1">
+              <a:lnSpc>
+                <a:spcPct val="90000"/>
+              </a:lnSpc>
+              <a:spcBef>
+                <a:spcPts val="1000"/>
+              </a:spcBef>
+              <a:buFont typeface="Arial" panose="020B0604020202020204" pitchFamily="34" charset="0"/>
+              <a:buChar char="•"/>
+              <a:defRPr sz="2800" kern="1200">
+                <a:solidFill>
+                  <a:schemeClr val="tx1"/>
+                </a:solidFill>
+                <a:latin typeface="+mn-lt"/>
+                <a:ea typeface="+mn-ea"/>
+                <a:cs typeface="+mn-cs"/>
+              </a:defRPr>
+            </a:lvl1pPr>
+            <a:lvl2pPr marL="685800" indent="-228600" algn="l" defTabSz="914400" rtl="0" eaLnBrk="1" latinLnBrk="0" hangingPunct="1">
+              <a:lnSpc>
+                <a:spcPct val="90000"/>
+              </a:lnSpc>
+              <a:spcBef>
+                <a:spcPts val="500"/>
+              </a:spcBef>
+              <a:buFont typeface="Arial" panose="020B0604020202020204" pitchFamily="34" charset="0"/>
+              <a:buChar char="•"/>
+              <a:defRPr sz="2400" kern="1200">
+                <a:solidFill>
+                  <a:schemeClr val="tx1"/>
+                </a:solidFill>
+                <a:latin typeface="+mn-lt"/>
+                <a:ea typeface="+mn-ea"/>
+                <a:cs typeface="+mn-cs"/>
+              </a:defRPr>
+            </a:lvl2pPr>
+            <a:lvl3pPr marL="1143000" indent="-228600" algn="l" defTabSz="914400" rtl="0" eaLnBrk="1" latinLnBrk="0" hangingPunct="1">
+              <a:lnSpc>
+                <a:spcPct val="90000"/>
+              </a:lnSpc>
+              <a:spcBef>
+                <a:spcPts val="500"/>
+              </a:spcBef>
+              <a:buFont typeface="Arial" panose="020B0604020202020204" pitchFamily="34" charset="0"/>
+              <a:buChar char="•"/>
+              <a:defRPr sz="2000" kern="1200">
+                <a:solidFill>
+                  <a:schemeClr val="tx1"/>
+                </a:solidFill>
+                <a:latin typeface="+mn-lt"/>
+                <a:ea typeface="+mn-ea"/>
+                <a:cs typeface="+mn-cs"/>
+              </a:defRPr>
+            </a:lvl3pPr>
+            <a:lvl4pPr marL="1600200" indent="-228600" algn="l" defTabSz="914400" rtl="0" eaLnBrk="1" latinLnBrk="0" hangingPunct="1">
+              <a:lnSpc>
+                <a:spcPct val="90000"/>
+              </a:lnSpc>
+              <a:spcBef>
+                <a:spcPts val="500"/>
+              </a:spcBef>
+              <a:buFont typeface="Arial" panose="020B0604020202020204" pitchFamily="34" charset="0"/>
+              <a:buChar char="•"/>
+              <a:defRPr sz="1800" kern="1200">
+                <a:solidFill>
+                  <a:schemeClr val="tx1"/>
+                </a:solidFill>
+                <a:latin typeface="+mn-lt"/>
+                <a:ea typeface="+mn-ea"/>
+                <a:cs typeface="+mn-cs"/>
+              </a:defRPr>
+            </a:lvl4pPr>
+            <a:lvl5pPr marL="2057400" indent="-228600" algn="l" defTabSz="914400" rtl="0" eaLnBrk="1" latinLnBrk="0" hangingPunct="1">
+              <a:lnSpc>
+                <a:spcPct val="90000"/>
+              </a:lnSpc>
+              <a:spcBef>
+                <a:spcPts val="500"/>
+              </a:spcBef>
+              <a:buFont typeface="Arial" panose="020B0604020202020204" pitchFamily="34" charset="0"/>
+              <a:buChar char="•"/>
+              <a:defRPr sz="1800" kern="1200">
+                <a:solidFill>
+                  <a:schemeClr val="tx1"/>
+                </a:solidFill>
+                <a:latin typeface="+mn-lt"/>
+                <a:ea typeface="+mn-ea"/>
+                <a:cs typeface="+mn-cs"/>
+              </a:defRPr>
+            </a:lvl5pPr>
+            <a:lvl6pPr marL="2514600" indent="-228600" algn="l" defTabSz="914400" rtl="0" eaLnBrk="1" latinLnBrk="0" hangingPunct="1">
+              <a:lnSpc>
+                <a:spcPct val="90000"/>
+              </a:lnSpc>
+              <a:spcBef>
+                <a:spcPts val="500"/>
+              </a:spcBef>
+              <a:buFont typeface="Arial" panose="020B0604020202020204" pitchFamily="34" charset="0"/>
+              <a:buChar char="•"/>
+              <a:defRPr sz="1800" kern="1200">
+                <a:solidFill>
+                  <a:schemeClr val="tx1"/>
+                </a:solidFill>
+                <a:latin typeface="+mn-lt"/>
+                <a:ea typeface="+mn-ea"/>
+                <a:cs typeface="+mn-cs"/>
+              </a:defRPr>
+            </a:lvl6pPr>
+            <a:lvl7pPr marL="2971800" indent="-228600" algn="l" defTabSz="914400" rtl="0" eaLnBrk="1" latinLnBrk="0" hangingPunct="1">
+              <a:lnSpc>
+                <a:spcPct val="90000"/>
+              </a:lnSpc>
+              <a:spcBef>
+                <a:spcPts val="500"/>
+              </a:spcBef>
+              <a:buFont typeface="Arial" panose="020B0604020202020204" pitchFamily="34" charset="0"/>
+              <a:buChar char="•"/>
+              <a:defRPr sz="1800" kern="1200">
+                <a:solidFill>
+                  <a:schemeClr val="tx1"/>
+                </a:solidFill>
+                <a:latin typeface="+mn-lt"/>
+                <a:ea typeface="+mn-ea"/>
+                <a:cs typeface="+mn-cs"/>
+              </a:defRPr>
+            </a:lvl7pPr>
+            <a:lvl8pPr marL="3429000" indent="-228600" algn="l" defTabSz="914400" rtl="0" eaLnBrk="1" latinLnBrk="0" hangingPunct="1">
+              <a:lnSpc>
+                <a:spcPct val="90000"/>
+              </a:lnSpc>
+              <a:spcBef>
+                <a:spcPts val="500"/>
+              </a:spcBef>
+              <a:buFont typeface="Arial" panose="020B0604020202020204" pitchFamily="34" charset="0"/>
+              <a:buChar char="•"/>
+              <a:defRPr sz="1800" kern="1200">
+                <a:solidFill>
+                  <a:schemeClr val="tx1"/>
+                </a:solidFill>
+                <a:latin typeface="+mn-lt"/>
+                <a:ea typeface="+mn-ea"/>
+                <a:cs typeface="+mn-cs"/>
+              </a:defRPr>
+            </a:lvl8pPr>
+            <a:lvl9pPr marL="3886200" indent="-228600" algn="l" defTabSz="914400" rtl="0" eaLnBrk="1" latinLnBrk="0" hangingPunct="1">
+              <a:lnSpc>
+                <a:spcPct val="90000"/>
+              </a:lnSpc>
+              <a:spcBef>
+                <a:spcPts val="500"/>
+              </a:spcBef>
+              <a:buFont typeface="Arial" panose="020B0604020202020204" pitchFamily="34" charset="0"/>
+              <a:buChar char="•"/>
+              <a:defRPr sz="1800" kern="1200">
+                <a:solidFill>
+                  <a:schemeClr val="tx1"/>
+                </a:solidFill>
+                <a:latin typeface="+mn-lt"/>
+                <a:ea typeface="+mn-ea"/>
+                <a:cs typeface="+mn-cs"/>
+              </a:defRPr>
+            </a:lvl9pPr>
+          </a:lstStyle>
+          <a:p>
+            <a:pPr marL="0" indent="0">
+              <a:buNone/>
+            </a:pPr>
+            <a:r>
+              <a:rPr lang="en-US" b="1" dirty="0" smtClean="0"/>
+              <a:t>"content"</a:t>
+            </a:r>
+            <a:r>
+              <a:rPr lang="en-US" dirty="0" smtClean="0"/>
+              <a:t>:{  </a:t>
+            </a:r>
+            <a:br>
+              <a:rPr lang="en-US" dirty="0" smtClean="0"/>
+            </a:br>
+            <a:r>
+              <a:rPr lang="en-US" dirty="0" smtClean="0"/>
+              <a:t>         </a:t>
+            </a:r>
+            <a:r>
+              <a:rPr lang="en-US" b="1" dirty="0" smtClean="0"/>
+              <a:t>"D."</a:t>
+            </a:r>
+            <a:r>
+              <a:rPr lang="en-US" dirty="0" smtClean="0"/>
+              <a:t>:"  Right thumb, amputation:\n?\</a:t>
+            </a:r>
+            <a:r>
+              <a:rPr lang="en-US" dirty="0" err="1" smtClean="0"/>
+              <a:t>tUlcerated</a:t>
+            </a:r>
+            <a:r>
+              <a:rPr lang="en-US" dirty="0" smtClean="0"/>
+              <a:t> keratinizing squamous cell carcinoma, moderately differentiated, extending 6 mm into the dermis and subcutaneous tissue, and completely excised.  \n?\</a:t>
+            </a:r>
+            <a:r>
+              <a:rPr lang="en-US" dirty="0" err="1" smtClean="0"/>
+              <a:t>tUnderlying</a:t>
+            </a:r>
+            <a:r>
+              <a:rPr lang="en-US" dirty="0" smtClean="0"/>
+              <a:t> viable bone with fatty marrow, but no evidence of carcinoma.",</a:t>
+            </a:r>
+            <a:br>
+              <a:rPr lang="en-US" dirty="0" smtClean="0"/>
+            </a:br>
+            <a:r>
+              <a:rPr lang="en-US" dirty="0" smtClean="0"/>
+              <a:t>         </a:t>
+            </a:r>
+            <a:r>
+              <a:rPr lang="en-US" b="1" dirty="0" smtClean="0"/>
+              <a:t>"B."</a:t>
+            </a:r>
+            <a:r>
+              <a:rPr lang="en-US" dirty="0" smtClean="0"/>
+              <a:t>:"  Margin #1 of right thumb, excision:\n?\</a:t>
+            </a:r>
+            <a:r>
+              <a:rPr lang="en-US" dirty="0" err="1" smtClean="0"/>
+              <a:t>tAcral</a:t>
+            </a:r>
+            <a:r>
+              <a:rPr lang="en-US" dirty="0" smtClean="0"/>
+              <a:t> skin and dermis with no specific pathological change.  \n\n",</a:t>
+            </a:r>
+            <a:br>
+              <a:rPr lang="en-US" dirty="0" smtClean="0"/>
+            </a:br>
+            <a:r>
+              <a:rPr lang="en-US" dirty="0" smtClean="0"/>
+              <a:t>         </a:t>
+            </a:r>
+            <a:r>
+              <a:rPr lang="en-US" b="1" dirty="0" smtClean="0"/>
+              <a:t>"C."</a:t>
+            </a:r>
+            <a:r>
+              <a:rPr lang="en-US" dirty="0" smtClean="0"/>
+              <a:t>:"  Margin #3 of right thumb, excision:\n?\</a:t>
+            </a:r>
+            <a:r>
+              <a:rPr lang="en-US" dirty="0" err="1" smtClean="0"/>
+              <a:t>tSkin</a:t>
+            </a:r>
+            <a:r>
+              <a:rPr lang="en-US" dirty="0" smtClean="0"/>
+              <a:t> and underlying dermis with no specific pathological change.\n\n",</a:t>
+            </a:r>
+            <a:br>
+              <a:rPr lang="en-US" dirty="0" smtClean="0"/>
+            </a:br>
+            <a:r>
+              <a:rPr lang="en-US" dirty="0" smtClean="0"/>
+              <a:t>         </a:t>
+            </a:r>
+            <a:r>
+              <a:rPr lang="en-US" b="1" dirty="0" smtClean="0"/>
+              <a:t>"A."</a:t>
+            </a:r>
+            <a:r>
+              <a:rPr lang="en-US" dirty="0" smtClean="0"/>
+              <a:t>:"  Margin #2 of thumb, excision:\n?\</a:t>
+            </a:r>
+            <a:r>
+              <a:rPr lang="en-US" dirty="0" err="1" smtClean="0"/>
+              <a:t>tAcral</a:t>
+            </a:r>
+            <a:r>
+              <a:rPr lang="en-US" dirty="0" smtClean="0"/>
+              <a:t> skin and underlying dermis with no specific pathological change.\n\n"</a:t>
+            </a:r>
+            <a:br>
+              <a:rPr lang="en-US" dirty="0" smtClean="0"/>
+            </a:br>
+            <a:r>
+              <a:rPr lang="en-US" dirty="0" smtClean="0"/>
+              <a:t>      },</a:t>
+            </a:r>
+            <a:br>
+              <a:rPr lang="en-US" dirty="0" smtClean="0"/>
+            </a:br>
+            <a:r>
+              <a:rPr lang="en-US" dirty="0" smtClean="0"/>
+              <a:t>      </a:t>
+            </a:r>
+            <a:r>
+              <a:rPr lang="en-US" b="1" dirty="0" smtClean="0"/>
+              <a:t>"Skin Cancer"</a:t>
+            </a:r>
+            <a:r>
+              <a:rPr lang="en-US" dirty="0" smtClean="0"/>
+              <a:t>:{  </a:t>
+            </a:r>
+            <a:br>
+              <a:rPr lang="en-US" dirty="0" smtClean="0"/>
+            </a:br>
+            <a:r>
+              <a:rPr lang="en-US" dirty="0" smtClean="0"/>
+              <a:t>         </a:t>
+            </a:r>
+            <a:r>
+              <a:rPr lang="en-US" b="1" dirty="0" smtClean="0">
+                <a:solidFill>
+                  <a:srgbClr val="FF0000"/>
+                </a:solidFill>
+              </a:rPr>
+              <a:t>"Total Lymph </a:t>
+            </a:r>
+            <a:r>
+              <a:rPr lang="en-US" b="1" dirty="0" err="1" smtClean="0">
+                <a:solidFill>
+                  <a:srgbClr val="FF0000"/>
+                </a:solidFill>
+              </a:rPr>
+              <a:t>Nodes_Number</a:t>
+            </a:r>
+            <a:r>
+              <a:rPr lang="en-US" b="1" dirty="0" smtClean="0">
+                <a:solidFill>
+                  <a:srgbClr val="FF0000"/>
+                </a:solidFill>
+              </a:rPr>
+              <a:t> of Positive"</a:t>
+            </a:r>
+            <a:r>
+              <a:rPr lang="en-US" dirty="0" smtClean="0">
+                <a:solidFill>
+                  <a:srgbClr val="FF0000"/>
+                </a:solidFill>
+              </a:rPr>
+              <a:t>:"_",</a:t>
+            </a:r>
+            <a:r>
+              <a:rPr lang="en-US" dirty="0" smtClean="0"/>
+              <a:t/>
+            </a:r>
+            <a:br>
+              <a:rPr lang="en-US" dirty="0" smtClean="0"/>
+            </a:br>
+            <a:r>
+              <a:rPr lang="en-US" dirty="0" smtClean="0"/>
+              <a:t>         </a:t>
+            </a:r>
+            <a:r>
+              <a:rPr lang="en-US" b="1" dirty="0" smtClean="0">
+                <a:solidFill>
+                  <a:srgbClr val="FF0000"/>
+                </a:solidFill>
+              </a:rPr>
+              <a:t>"Total Lymph </a:t>
+            </a:r>
+            <a:r>
+              <a:rPr lang="en-US" b="1" dirty="0" err="1" smtClean="0">
+                <a:solidFill>
+                  <a:srgbClr val="FF0000"/>
+                </a:solidFill>
+              </a:rPr>
+              <a:t>Nodes_Size</a:t>
+            </a:r>
+            <a:r>
+              <a:rPr lang="en-US" b="1" dirty="0" smtClean="0">
+                <a:solidFill>
+                  <a:srgbClr val="FF0000"/>
+                </a:solidFill>
+              </a:rPr>
+              <a:t> of Longest Metastasis"</a:t>
+            </a:r>
+            <a:r>
+              <a:rPr lang="en-US" dirty="0" smtClean="0">
+                <a:solidFill>
+                  <a:srgbClr val="FF0000"/>
+                </a:solidFill>
+              </a:rPr>
+              <a:t>:"_ mm",</a:t>
+            </a:r>
+            <a:r>
+              <a:rPr lang="en-US" dirty="0" smtClean="0"/>
+              <a:t/>
+            </a:r>
+            <a:br>
+              <a:rPr lang="en-US" dirty="0" smtClean="0"/>
+            </a:br>
+            <a:r>
+              <a:rPr lang="en-US" dirty="0" smtClean="0"/>
+              <a:t>         </a:t>
+            </a:r>
+            <a:r>
+              <a:rPr lang="en-US" b="1" dirty="0" smtClean="0">
+                <a:solidFill>
+                  <a:schemeClr val="accent6"/>
+                </a:solidFill>
+              </a:rPr>
+              <a:t>"Histologic Type of </a:t>
+            </a:r>
+            <a:r>
+              <a:rPr lang="en-US" b="1" dirty="0" err="1" smtClean="0">
+                <a:solidFill>
+                  <a:schemeClr val="accent6"/>
+                </a:solidFill>
+              </a:rPr>
+              <a:t>Tumor"</a:t>
+            </a:r>
+            <a:r>
+              <a:rPr lang="en-US" dirty="0" err="1" smtClean="0">
+                <a:solidFill>
+                  <a:schemeClr val="accent6"/>
+                </a:solidFill>
+              </a:rPr>
+              <a:t>:"Keratinizing</a:t>
+            </a:r>
+            <a:r>
+              <a:rPr lang="en-US" dirty="0" smtClean="0">
+                <a:solidFill>
+                  <a:schemeClr val="accent6"/>
+                </a:solidFill>
+              </a:rPr>
+              <a:t> squamous cell",</a:t>
+            </a:r>
+            <a:br>
+              <a:rPr lang="en-US" dirty="0" smtClean="0">
+                <a:solidFill>
+                  <a:schemeClr val="accent6"/>
+                </a:solidFill>
+              </a:rPr>
+            </a:br>
+            <a:r>
+              <a:rPr lang="en-US" dirty="0" smtClean="0"/>
+              <a:t>         </a:t>
+            </a:r>
+            <a:r>
+              <a:rPr lang="en-US" b="1" dirty="0" smtClean="0"/>
+              <a:t>"</a:t>
+            </a:r>
+            <a:r>
+              <a:rPr lang="en-US" b="1" dirty="0" err="1" smtClean="0"/>
+              <a:t>Perineural</a:t>
+            </a:r>
+            <a:r>
+              <a:rPr lang="en-US" b="1" dirty="0" smtClean="0"/>
+              <a:t> </a:t>
+            </a:r>
+            <a:r>
+              <a:rPr lang="en-US" b="1" dirty="0" err="1" smtClean="0"/>
+              <a:t>Invasion"</a:t>
+            </a:r>
+            <a:r>
+              <a:rPr lang="en-US" dirty="0" err="1" smtClean="0"/>
+              <a:t>:"Not</a:t>
+            </a:r>
+            <a:r>
+              <a:rPr lang="en-US" dirty="0" smtClean="0"/>
+              <a:t> identified",</a:t>
+            </a:r>
+            <a:br>
+              <a:rPr lang="en-US" dirty="0" smtClean="0"/>
+            </a:br>
+            <a:r>
+              <a:rPr lang="en-US" dirty="0" smtClean="0"/>
+              <a:t>         </a:t>
+            </a:r>
+            <a:r>
+              <a:rPr lang="en-US" b="1" dirty="0" smtClean="0"/>
+              <a:t>"</a:t>
+            </a:r>
+            <a:r>
+              <a:rPr lang="en-US" b="1" dirty="0" err="1" smtClean="0"/>
+              <a:t>Lymphovascular</a:t>
+            </a:r>
+            <a:r>
+              <a:rPr lang="en-US" b="1" dirty="0" smtClean="0"/>
+              <a:t> </a:t>
+            </a:r>
+            <a:r>
+              <a:rPr lang="en-US" b="1" dirty="0" err="1" smtClean="0"/>
+              <a:t>Invasion"</a:t>
+            </a:r>
+            <a:r>
+              <a:rPr lang="en-US" dirty="0" err="1" smtClean="0"/>
+              <a:t>:"Not</a:t>
+            </a:r>
+            <a:r>
+              <a:rPr lang="en-US" dirty="0" smtClean="0"/>
+              <a:t> identified",</a:t>
+            </a:r>
+            <a:br>
+              <a:rPr lang="en-US" dirty="0" smtClean="0"/>
+            </a:br>
+            <a:r>
+              <a:rPr lang="en-US" dirty="0" smtClean="0"/>
+              <a:t>        </a:t>
+            </a:r>
+            <a:r>
+              <a:rPr lang="en-US" dirty="0" smtClean="0">
+                <a:solidFill>
+                  <a:srgbClr val="FFFF00"/>
+                </a:solidFill>
+              </a:rPr>
+              <a:t> </a:t>
+            </a:r>
+            <a:r>
+              <a:rPr lang="en-US" b="1" dirty="0" smtClean="0">
+                <a:solidFill>
+                  <a:srgbClr val="FFFF00"/>
+                </a:solidFill>
+              </a:rPr>
+              <a:t>"Anatomic Site of </a:t>
+            </a:r>
+            <a:r>
+              <a:rPr lang="en-US" b="1" dirty="0" err="1" smtClean="0">
+                <a:solidFill>
+                  <a:srgbClr val="FFFF00"/>
+                </a:solidFill>
+              </a:rPr>
+              <a:t>Tumor"</a:t>
+            </a:r>
+            <a:r>
+              <a:rPr lang="en-US" dirty="0" err="1" smtClean="0">
+                <a:solidFill>
+                  <a:srgbClr val="FFFF00"/>
+                </a:solidFill>
+              </a:rPr>
+              <a:t>:"Right</a:t>
+            </a:r>
+            <a:r>
+              <a:rPr lang="en-US" dirty="0" smtClean="0">
+                <a:solidFill>
+                  <a:srgbClr val="FFFF00"/>
+                </a:solidFill>
+              </a:rPr>
+              <a:t> thumb",</a:t>
+            </a:r>
+            <a:br>
+              <a:rPr lang="en-US" dirty="0" smtClean="0">
+                <a:solidFill>
+                  <a:srgbClr val="FFFF00"/>
+                </a:solidFill>
+              </a:rPr>
+            </a:br>
+            <a:r>
+              <a:rPr lang="en-US" dirty="0" smtClean="0"/>
+              <a:t>        </a:t>
+            </a:r>
+            <a:r>
+              <a:rPr lang="en-US" dirty="0" smtClean="0">
+                <a:solidFill>
+                  <a:srgbClr val="002060"/>
+                </a:solidFill>
+              </a:rPr>
+              <a:t> </a:t>
+            </a:r>
+            <a:r>
+              <a:rPr lang="en-US" b="1" dirty="0" smtClean="0">
+                <a:solidFill>
+                  <a:srgbClr val="002060"/>
+                </a:solidFill>
+              </a:rPr>
+              <a:t>"Depth of </a:t>
+            </a:r>
+            <a:r>
+              <a:rPr lang="en-US" b="1" dirty="0" err="1" smtClean="0">
+                <a:solidFill>
+                  <a:srgbClr val="002060"/>
+                </a:solidFill>
+              </a:rPr>
+              <a:t>Invasion"</a:t>
+            </a:r>
+            <a:r>
+              <a:rPr lang="en-US" dirty="0" err="1" smtClean="0">
+                <a:solidFill>
+                  <a:srgbClr val="002060"/>
+                </a:solidFill>
+              </a:rPr>
+              <a:t>:"Subcutaneous</a:t>
+            </a:r>
+            <a:r>
+              <a:rPr lang="en-US" dirty="0" smtClean="0">
+                <a:solidFill>
+                  <a:srgbClr val="002060"/>
+                </a:solidFill>
+              </a:rPr>
+              <a:t> tissue to the level of bone",</a:t>
+            </a:r>
+            <a:br>
+              <a:rPr lang="en-US" dirty="0" smtClean="0">
+                <a:solidFill>
+                  <a:srgbClr val="002060"/>
+                </a:solidFill>
+              </a:rPr>
+            </a:br>
+            <a:r>
+              <a:rPr lang="en-US" dirty="0" smtClean="0"/>
+              <a:t>         </a:t>
+            </a:r>
+            <a:r>
+              <a:rPr lang="en-US" b="1" dirty="0" smtClean="0">
+                <a:solidFill>
+                  <a:srgbClr val="FF0000"/>
+                </a:solidFill>
+              </a:rPr>
+              <a:t>"Total Lymph Nodes"</a:t>
+            </a:r>
+            <a:r>
+              <a:rPr lang="en-US" dirty="0" smtClean="0">
+                <a:solidFill>
+                  <a:srgbClr val="FF0000"/>
+                </a:solidFill>
+              </a:rPr>
+              <a:t>:"0",</a:t>
+            </a:r>
+            <a:br>
+              <a:rPr lang="en-US" dirty="0" smtClean="0">
+                <a:solidFill>
+                  <a:srgbClr val="FF0000"/>
+                </a:solidFill>
+              </a:rPr>
+            </a:br>
+            <a:r>
+              <a:rPr lang="en-US" dirty="0" smtClean="0"/>
+              <a:t>         </a:t>
+            </a:r>
+            <a:r>
+              <a:rPr lang="en-US" b="1" dirty="0" smtClean="0"/>
+              <a:t>"Underlying Bone </a:t>
+            </a:r>
+            <a:r>
+              <a:rPr lang="en-US" b="1" dirty="0" err="1" smtClean="0"/>
+              <a:t>Invasion"</a:t>
+            </a:r>
+            <a:r>
+              <a:rPr lang="en-US" dirty="0" err="1" smtClean="0"/>
+              <a:t>:"Not</a:t>
+            </a:r>
+            <a:r>
+              <a:rPr lang="en-US" dirty="0" smtClean="0"/>
+              <a:t> identified",</a:t>
+            </a:r>
+            <a:br>
+              <a:rPr lang="en-US" dirty="0" smtClean="0"/>
+            </a:br>
+            <a:r>
+              <a:rPr lang="en-US" dirty="0" smtClean="0"/>
+              <a:t>         </a:t>
+            </a:r>
+            <a:r>
+              <a:rPr lang="en-US" b="1" dirty="0" smtClean="0"/>
+              <a:t>"Total Lymph </a:t>
+            </a:r>
+            <a:r>
+              <a:rPr lang="en-US" b="1" dirty="0" err="1" smtClean="0"/>
+              <a:t>Nodes_Extranodal</a:t>
+            </a:r>
+            <a:r>
+              <a:rPr lang="en-US" b="1" dirty="0" smtClean="0"/>
+              <a:t> Extension"</a:t>
+            </a:r>
+            <a:r>
+              <a:rPr lang="en-US" dirty="0" smtClean="0"/>
+              <a:t>:"_",</a:t>
+            </a:r>
+            <a:br>
+              <a:rPr lang="en-US" dirty="0" smtClean="0"/>
+            </a:br>
+            <a:r>
+              <a:rPr lang="en-US" dirty="0" smtClean="0"/>
+              <a:t>        </a:t>
+            </a:r>
+            <a:r>
+              <a:rPr lang="en-US" dirty="0" smtClean="0">
+                <a:solidFill>
+                  <a:schemeClr val="accent1"/>
+                </a:solidFill>
+              </a:rPr>
+              <a:t> </a:t>
+            </a:r>
+            <a:r>
+              <a:rPr lang="en-US" b="1" dirty="0" smtClean="0">
+                <a:solidFill>
+                  <a:schemeClr val="accent1"/>
+                </a:solidFill>
+              </a:rPr>
+              <a:t>"</a:t>
+            </a:r>
+            <a:r>
+              <a:rPr lang="en-US" b="1" dirty="0" err="1" smtClean="0">
+                <a:solidFill>
+                  <a:schemeClr val="accent1"/>
+                </a:solidFill>
+              </a:rPr>
+              <a:t>Margins"</a:t>
+            </a:r>
+            <a:r>
+              <a:rPr lang="en-US" dirty="0" err="1" smtClean="0">
+                <a:solidFill>
+                  <a:schemeClr val="accent1"/>
+                </a:solidFill>
+              </a:rPr>
+              <a:t>:"Clear</a:t>
+            </a:r>
+            <a:r>
+              <a:rPr lang="en-US" dirty="0" smtClean="0">
+                <a:solidFill>
+                  <a:schemeClr val="accent1"/>
+                </a:solidFill>
+              </a:rPr>
+              <a:t>",</a:t>
+            </a:r>
+            <a:br>
+              <a:rPr lang="en-US" dirty="0" smtClean="0">
+                <a:solidFill>
+                  <a:schemeClr val="accent1"/>
+                </a:solidFill>
+              </a:rPr>
+            </a:br>
+            <a:r>
+              <a:rPr lang="en-US" dirty="0" smtClean="0"/>
+              <a:t>        </a:t>
+            </a:r>
+            <a:r>
+              <a:rPr lang="en-US" dirty="0" smtClean="0">
+                <a:solidFill>
+                  <a:schemeClr val="accent6"/>
+                </a:solidFill>
+              </a:rPr>
+              <a:t> </a:t>
+            </a:r>
+            <a:r>
+              <a:rPr lang="en-US" b="1" dirty="0" smtClean="0">
+                <a:solidFill>
+                  <a:schemeClr val="accent6"/>
+                </a:solidFill>
+              </a:rPr>
+              <a:t>"Histologic Type of Tumor_Grade"</a:t>
+            </a:r>
+            <a:r>
+              <a:rPr lang="en-US" dirty="0" smtClean="0">
+                <a:solidFill>
+                  <a:schemeClr val="accent6"/>
+                </a:solidFill>
+              </a:rPr>
+              <a:t>:"2 of 3",</a:t>
+            </a:r>
+            <a:br>
+              <a:rPr lang="en-US" dirty="0" smtClean="0">
+                <a:solidFill>
+                  <a:schemeClr val="accent6"/>
+                </a:solidFill>
+              </a:rPr>
+            </a:br>
+            <a:r>
+              <a:rPr lang="en-US" dirty="0" smtClean="0">
+                <a:solidFill>
+                  <a:schemeClr val="accent6"/>
+                </a:solidFill>
+              </a:rPr>
+              <a:t>         </a:t>
+            </a:r>
+            <a:r>
+              <a:rPr lang="en-US" b="1" dirty="0" smtClean="0">
+                <a:solidFill>
+                  <a:schemeClr val="accent6"/>
+                </a:solidFill>
+              </a:rPr>
+              <a:t>"Histologic Type of Tumor_Size"</a:t>
+            </a:r>
+            <a:r>
+              <a:rPr lang="en-US" dirty="0" smtClean="0">
+                <a:solidFill>
+                  <a:schemeClr val="accent6"/>
+                </a:solidFill>
+              </a:rPr>
+              <a:t>:"5.8 x 5.2 cm",</a:t>
+            </a:r>
+            <a:br>
+              <a:rPr lang="en-US" dirty="0" smtClean="0">
+                <a:solidFill>
+                  <a:schemeClr val="accent6"/>
+                </a:solidFill>
+              </a:rPr>
+            </a:br>
+            <a:r>
+              <a:rPr lang="en-US" dirty="0" smtClean="0"/>
+              <a:t>         </a:t>
+            </a:r>
+            <a:r>
+              <a:rPr lang="en-US" b="1" dirty="0" smtClean="0">
+                <a:solidFill>
+                  <a:srgbClr val="FF0000"/>
+                </a:solidFill>
+              </a:rPr>
+              <a:t>"Total Lymph </a:t>
+            </a:r>
+            <a:r>
+              <a:rPr lang="en-US" b="1" dirty="0" err="1" smtClean="0">
+                <a:solidFill>
+                  <a:srgbClr val="FF0000"/>
+                </a:solidFill>
+              </a:rPr>
+              <a:t>Nodes_Other</a:t>
+            </a:r>
+            <a:r>
+              <a:rPr lang="en-US" b="1" dirty="0" smtClean="0">
+                <a:solidFill>
+                  <a:srgbClr val="FF0000"/>
+                </a:solidFill>
+              </a:rPr>
+              <a:t> Metastatic Sites"</a:t>
+            </a:r>
+            <a:r>
+              <a:rPr lang="en-US" dirty="0" smtClean="0">
+                <a:solidFill>
+                  <a:srgbClr val="FF0000"/>
+                </a:solidFill>
+              </a:rPr>
+              <a:t>:"_ N/A"</a:t>
+            </a:r>
+            <a:br>
+              <a:rPr lang="en-US" dirty="0" smtClean="0">
+                <a:solidFill>
+                  <a:srgbClr val="FF0000"/>
+                </a:solidFill>
+              </a:rPr>
+            </a:br>
+            <a:r>
+              <a:rPr lang="en-US" dirty="0" smtClean="0"/>
+              <a:t>      }</a:t>
+            </a:r>
+            <a:br>
+              <a:rPr lang="en-US" dirty="0" smtClean="0"/>
+            </a:br>
+            <a:r>
+              <a:rPr lang="en-US" dirty="0" smtClean="0"/>
+              <a:t>   },</a:t>
             </a:r>
             <a:endParaRPr lang="en-US" dirty="0"/>
           </a:p>
@@ -3119,13 +4205,20 @@
     </p:spTree>
     <p:extLst>
       <p:ext uri="{BB962C8B-B14F-4D97-AF65-F5344CB8AC3E}">
-        <p14:creationId xmlns:p14="http://schemas.microsoft.com/office/powerpoint/2010/main" val="375366227"/>
+        <p14:creationId xmlns:p14="http://schemas.microsoft.com/office/powerpoint/2010/main" val="3296012110"/>
       </p:ext>
     </p:extLst>
   </p:cSld>
   <p:clrMapOvr>
     <a:masterClrMapping/>
   </p:clrMapOvr>
+  <p:timing>
+    <p:tnLst>
+      <p:par>
+        <p:cTn id="1" dur="indefinite" restart="never" nodeType="tmRoot"/>
+      </p:par>
+    </p:tnLst>
+  </p:timing>
 </p:sld>
 </file>
 
@@ -3163,6 +4256,100 @@
           <a:p>
             <a:r>
               <a:rPr lang="en-US" dirty="0" smtClean="0"/>
+              <a:t>Overview</a:t>
+            </a:r>
+            <a:endParaRPr lang="en-US" dirty="0"/>
+          </a:p>
+        </p:txBody>
+      </p:sp>
+      <p:sp>
+        <p:nvSpPr>
+          <p:cNvPr id="3" name="Content Placeholder 2"/>
+          <p:cNvSpPr>
+            <a:spLocks noGrp="1"/>
+          </p:cNvSpPr>
+          <p:nvPr>
+            <p:ph idx="1"/>
+          </p:nvPr>
+        </p:nvSpPr>
+        <p:spPr/>
+        <p:txBody>
+          <a:bodyPr/>
+          <a:lstStyle/>
+          <a:p>
+            <a:r>
+              <a:rPr lang="en-US" dirty="0" smtClean="0"/>
+              <a:t>Objective: Extracting data points and corresponding values contained in the note</a:t>
+            </a:r>
+          </a:p>
+          <a:p>
+            <a:r>
+              <a:rPr lang="en-US" dirty="0" smtClean="0"/>
+              <a:t>Input: Structured pathology note</a:t>
+            </a:r>
+          </a:p>
+          <a:p>
+            <a:r>
+              <a:rPr lang="en-US" dirty="0" smtClean="0"/>
+              <a:t>Algorithm: Regular Expression, Rule-based </a:t>
+            </a:r>
+          </a:p>
+          <a:p>
+            <a:r>
+              <a:rPr lang="en-US" dirty="0" smtClean="0"/>
+              <a:t>Output: Cancer types, data points and values  </a:t>
+            </a:r>
+            <a:endParaRPr lang="en-US" dirty="0"/>
+          </a:p>
+        </p:txBody>
+      </p:sp>
+    </p:spTree>
+    <p:extLst>
+      <p:ext uri="{BB962C8B-B14F-4D97-AF65-F5344CB8AC3E}">
+        <p14:creationId xmlns:p14="http://schemas.microsoft.com/office/powerpoint/2010/main" val="375366227"/>
+      </p:ext>
+    </p:extLst>
+  </p:cSld>
+  <p:clrMapOvr>
+    <a:masterClrMapping/>
+  </p:clrMapOvr>
+</p:sld>
+</file>
+
+<file path=ppt/slides/slide4.xml><?xml version="1.0" encoding="utf-8"?>
+<p:sld xmlns:a="http://schemas.openxmlformats.org/drawingml/2006/main" xmlns:r="http://schemas.openxmlformats.org/officeDocument/2006/relationships" xmlns:p="http://schemas.openxmlformats.org/presentationml/2006/main">
+  <p:cSld>
+    <p:spTree>
+      <p:nvGrpSpPr>
+        <p:cNvPr id="1" name=""/>
+        <p:cNvGrpSpPr/>
+        <p:nvPr/>
+      </p:nvGrpSpPr>
+      <p:grpSpPr>
+        <a:xfrm>
+          <a:off x="0" y="0"/>
+          <a:ext cx="0" cy="0"/>
+          <a:chOff x="0" y="0"/>
+          <a:chExt cx="0" cy="0"/>
+        </a:xfrm>
+      </p:grpSpPr>
+      <p:sp>
+        <p:nvSpPr>
+          <p:cNvPr id="2" name="Title 1"/>
+          <p:cNvSpPr>
+            <a:spLocks noGrp="1"/>
+          </p:cNvSpPr>
+          <p:nvPr>
+            <p:ph type="title"/>
+          </p:nvPr>
+        </p:nvSpPr>
+        <p:spPr/>
+        <p:txBody>
+          <a:bodyPr/>
+          <a:lstStyle/>
+          <a:p>
+            <a:r>
+              <a:rPr lang="en-US" dirty="0" smtClean="0"/>
               <a:t>Algorithm</a:t>
             </a:r>
             <a:endParaRPr lang="en-US" dirty="0"/>
@@ -3231,7 +4418,7 @@
 </p:sld>
 </file>
 
-<file path=ppt/slides/slide4.xml><?xml version="1.0" encoding="utf-8"?>
+<file path=ppt/slides/slide5.xml><?xml version="1.0" encoding="utf-8"?>
 <p:sld xmlns:a="http://schemas.openxmlformats.org/drawingml/2006/main" xmlns:r="http://schemas.openxmlformats.org/officeDocument/2006/relationships" xmlns:p="http://schemas.openxmlformats.org/presentationml/2006/main">
   <p:cSld>
     <p:spTree>
@@ -3449,7 +4636,7 @@
 </p:sld>
 </file>
 
-<file path=ppt/slides/slide5.xml><?xml version="1.0" encoding="utf-8"?>
+<file path=ppt/slides/slide6.xml><?xml version="1.0" encoding="utf-8"?>
 <p:sld xmlns:a="http://schemas.openxmlformats.org/drawingml/2006/main" xmlns:r="http://schemas.openxmlformats.org/officeDocument/2006/relationships" xmlns:p="http://schemas.openxmlformats.org/presentationml/2006/main">
   <p:cSld>
     <p:spTree>
@@ -3558,7 +4745,7 @@
 </p:sld>
 </file>
 
-<file path=ppt/slides/slide6.xml><?xml version="1.0" encoding="utf-8"?>
+<file path=ppt/slides/slide7.xml><?xml version="1.0" encoding="utf-8"?>
 <p:sld xmlns:a="http://schemas.openxmlformats.org/drawingml/2006/main" xmlns:r="http://schemas.openxmlformats.org/officeDocument/2006/relationships" xmlns:p="http://schemas.openxmlformats.org/presentationml/2006/main">
   <p:cSld>
     <p:spTree>
@@ -3715,7 +4902,7 @@
 </p:sld>
 </file>
 
-<file path=ppt/slides/slide7.xml><?xml version="1.0" encoding="utf-8"?>
+<file path=ppt/slides/slide8.xml><?xml version="1.0" encoding="utf-8"?>
 <p:sld xmlns:a="http://schemas.openxmlformats.org/drawingml/2006/main" xmlns:r="http://schemas.openxmlformats.org/officeDocument/2006/relationships" xmlns:p="http://schemas.openxmlformats.org/presentationml/2006/main">
   <p:cSld>
     <p:spTree>
@@ -4298,7 +5485,7 @@
 </p:sld>
 </file>
 
-<file path=ppt/slides/slide8.xml><?xml version="1.0" encoding="utf-8"?>
+<file path=ppt/slides/slide9.xml><?xml version="1.0" encoding="utf-8"?>
 <p:sld xmlns:a="http://schemas.openxmlformats.org/drawingml/2006/main" xmlns:r="http://schemas.openxmlformats.org/officeDocument/2006/relationships" xmlns:p="http://schemas.openxmlformats.org/presentationml/2006/main">
   <p:cSld>
     <p:spTree>
@@ -4332,7 +5519,7 @@
           <a:p>
             <a:r>
               <a:rPr lang="en-US" dirty="0" smtClean="0"/>
-              <a:t>Proposed work</a:t>
+              <a:t>Confidence score</a:t>
             </a:r>
             <a:endParaRPr lang="en-US" dirty="0"/>
           </a:p>
@@ -4353,23 +5540,28 @@
           <a:bodyPr/>
           <a:lstStyle/>
           <a:p>
-            <a:r>
-              <a:rPr lang="en-US" dirty="0" smtClean="0"/>
-              <a:t>Automatically calculate confident score for each value extracted</a:t>
-            </a:r>
-          </a:p>
-          <a:p>
-            <a:r>
-              <a:rPr lang="en-US" dirty="0" smtClean="0"/>
-              <a:t>Apply to each cancer type and each data point separately</a:t>
-            </a:r>
-          </a:p>
-          <a:p>
-            <a:r>
-              <a:rPr lang="en-US" dirty="0" smtClean="0"/>
-              <a:t>Based on type of text, frequency, length of text,… </a:t>
+            <a:endParaRPr lang="en-US" dirty="0" smtClean="0"/>
+          </a:p>
+          <a:p>
+            <a:r>
+              <a:rPr lang="en-US" dirty="0" smtClean="0"/>
+              <a:t>This confidence score is to test ou</a:t>
+            </a:r>
+            <a:r>
+              <a:rPr lang="en-US" dirty="0" smtClean="0"/>
+              <a:t>r extracted result, not for the actual data. E.g. it wont tell you how accurate the actual data is. </a:t>
             </a:r>
             <a:endParaRPr lang="en-US" dirty="0"/>
+          </a:p>
+          <a:p>
+            <a:r>
+              <a:rPr lang="en-US" dirty="0" smtClean="0"/>
+              <a:t>Confidence score </a:t>
+            </a:r>
+            <a:r>
+              <a:rPr lang="en-US" dirty="0" smtClean="0"/>
+              <a:t>analysis is important because the data is not clean. Some errors are unavoidable, and we have to check. </a:t>
+            </a:r>
           </a:p>
         </p:txBody>
       </p:sp>
@@ -4383,6 +5575,13 @@
   <p:clrMapOvr>
     <a:masterClrMapping/>
   </p:clrMapOvr>
+  <p:timing>
+    <p:tnLst>
+      <p:par>
+        <p:cTn id="1" dur="indefinite" restart="never" nodeType="tmRoot"/>
+      </p:par>
+    </p:tnLst>
+  </p:timing>
 </p:sld>
 </file>
 

</xml_diff>